<commit_message>
Deploying to gh-pages from @ ManuelePasini/slides-markdown@c83673e9de89fc726a8319b2189a2a8268fc4fc2 🚀
</commit_message>
<xml_diff>
--- a/dolap_2024_slides_2version.pptx
+++ b/dolap_2024_slides_2version.pptx
@@ -3738,7 +3738,15 @@
                 <a:pPr lvl="0"/>
                 <a:r>
                   <a:rPr/>
-                  <a:t>Each node is characterized with a set of properties from the previously determined taxonomy.</a:t>
+                  <a:t>Each node is characterized with a </a:t>
+                </a:r>
+                <a:r>
+                  <a:rPr i="1"/>
+                  <a:t>set of properties</a:t>
+                </a:r>
+                <a:r>
+                  <a:rPr/>
+                  <a:t> from the previously determined taxonomy.</a:t>
                 </a:r>
               </a:p>
               <a:p>
@@ -8288,7 +8296,7 @@
             </a:pPr>
             <a:r>
               <a:rPr/>
-              <a:t>Data analytics nowadays mostly rely on cloud infrastructures and data platforms are facilitators of such analytics!</a:t>
+              <a:t>Data analytics nowadays mostly rely on cloud infrastructures and data platforms act as facilitators of such analytics!</a:t>
             </a:r>
           </a:p>
         </p:txBody>

</xml_diff>

<commit_message>
Deploying to gh-pages from @ ManuelePasini/slides-markdown@b88f12b86b9b18cb5c20c000c4c6d69535798d01 🚀
</commit_message>
<xml_diff>
--- a/dolap_2024_slides_2version.pptx
+++ b/dolap_2024_slides_2version.pptx
@@ -7954,6 +7954,17 @@
             <a:pPr lvl="0"/>
             <a:r>
               <a:rPr i="1"/>
+              <a:t>Graphs formalization</a:t>
+            </a:r>
+            <a:r>
+              <a:rPr/>
+              <a:t>: the definition both service graph and process graph relies on manual work, more automated techniques should be explored (e.g., NLPs)</a:t>
+            </a:r>
+          </a:p>
+          <a:p>
+            <a:pPr lvl="0"/>
+            <a:r>
+              <a:rPr i="1"/>
               <a:t>Metadata integration</a:t>
             </a:r>
             <a:r>
@@ -8209,17 +8220,59 @@
               <a:t> (CSPs).</a:t>
             </a:r>
           </a:p>
-          <a:p>
-            <a:pPr lvl="0" indent="0" marL="0">
-              <a:buNone/>
-            </a:pPr>
-            <a:r>
-              <a:rPr/>
-              <a:t>Some of the AWS Services</a:t>
-            </a:r>
-          </a:p>
-          <a:p>
-            <a:pPr lvl="0" indent="0" marL="0">
+        </p:txBody>
+      </p:sp>
+      <p:pic>
+        <p:nvPicPr>
+          <p:cNvPr descr="https://github.com/ManuelePasini/slides-markdown/blob/4893698e949da4ee45c95087b170c011a4b9f687/slides/images/aws_services.png?raw=true" id="0" name="Picture 1"/>
+          <p:cNvPicPr>
+            <a:picLocks noGrp="1" noChangeAspect="1"/>
+          </p:cNvPicPr>
+          <p:nvPr/>
+        </p:nvPicPr>
+        <p:blipFill>
+          <a:blip r:embed="rId2"/>
+          <a:stretch>
+            <a:fillRect/>
+          </a:stretch>
+        </p:blipFill>
+        <p:spPr bwMode="auto">
+          <a:xfrm>
+            <a:off x="1320800" y="1193800"/>
+            <a:ext cx="6515100" cy="2882900"/>
+          </a:xfrm>
+          <a:prstGeom prst="rect">
+            <a:avLst/>
+          </a:prstGeom>
+          <a:noFill/>
+          <a:ln w="9525">
+            <a:noFill/>
+            <a:headEnd/>
+            <a:tailEnd/>
+          </a:ln>
+        </p:spPr>
+      </p:pic>
+      <p:sp>
+        <p:nvSpPr>
+          <p:cNvPr id="1" name="TextBox 3"/>
+          <p:cNvSpPr txBox="1"/>
+          <p:nvPr/>
+        </p:nvSpPr>
+        <p:spPr>
+          <a:xfrm>
+            <a:off x="457200" y="4076700"/>
+            <a:ext cx="8229600" cy="508000"/>
+          </a:xfrm>
+          <a:prstGeom prst="rect">
+            <a:avLst/>
+          </a:prstGeom>
+          <a:noFill/>
+        </p:spPr>
+        <p:txBody>
+          <a:bodyPr/>
+          <a:lstStyle/>
+          <a:p>
+            <a:pPr lvl="0" indent="0" marL="0" algn="ctr">
               <a:buNone/>
             </a:pPr>
             <a:r>
@@ -8296,7 +8349,7 @@
             </a:pPr>
             <a:r>
               <a:rPr/>
-              <a:t>Data analytics nowadays mostly rely on cloud infrastructures and data platforms act as facilitators of such analytics!</a:t>
+              <a:t>Data analytics nowadays mostly rely on cloud infrastructures!</a:t>
             </a:r>
           </a:p>
         </p:txBody>
@@ -8341,7 +8394,7 @@
             <a:pPr lvl="0"/>
             <a:r>
               <a:rPr/>
-              <a:t>Some CSPs categorize their services in relation to the role they play in a standard data pipeline…</a:t>
+              <a:t>Some CSPs categorize their services in relation to the role they play in an analytical data pipeline…</a:t>
             </a:r>
           </a:p>
           <a:p>
@@ -8360,31 +8413,57 @@
           </a:p>
         </p:txBody>
       </p:sp>
-      <p:sp>
-        <p:nvSpPr>
-          <p:cNvPr id="4" name="Content Placeholder 3"/>
-          <p:cNvSpPr>
-            <a:spLocks noGrp="1"/>
-          </p:cNvSpPr>
-          <p:nvPr>
-            <p:ph idx="2" sz="half"/>
-          </p:nvPr>
-        </p:nvSpPr>
-        <p:spPr/>
+      <p:pic>
+        <p:nvPicPr>
+          <p:cNvPr descr="https://raw.githubusercontent.com/ManuelePasini/slides-markdown/master/slides/images/cloud_platform.bmp" id="0" name="Picture 1"/>
+          <p:cNvPicPr>
+            <a:picLocks noGrp="1" noChangeAspect="1"/>
+          </p:cNvPicPr>
+          <p:nvPr/>
+        </p:nvPicPr>
+        <p:blipFill>
+          <a:blip r:embed="rId2"/>
+          <a:stretch>
+            <a:fillRect/>
+          </a:stretch>
+        </p:blipFill>
+        <p:spPr bwMode="auto">
+          <a:xfrm>
+            <a:off x="4648200" y="1295400"/>
+            <a:ext cx="4038600" cy="2692400"/>
+          </a:xfrm>
+          <a:prstGeom prst="rect">
+            <a:avLst/>
+          </a:prstGeom>
+          <a:noFill/>
+          <a:ln w="9525">
+            <a:noFill/>
+            <a:headEnd/>
+            <a:tailEnd/>
+          </a:ln>
+        </p:spPr>
+      </p:pic>
+      <p:sp>
+        <p:nvSpPr>
+          <p:cNvPr id="1" name="TextBox 3"/>
+          <p:cNvSpPr txBox="1"/>
+          <p:nvPr/>
+        </p:nvSpPr>
+        <p:spPr>
+          <a:xfrm>
+            <a:off x="4648200" y="4076700"/>
+            <a:ext cx="4038600" cy="508000"/>
+          </a:xfrm>
+          <a:prstGeom prst="rect">
+            <a:avLst/>
+          </a:prstGeom>
+          <a:noFill/>
+        </p:spPr>
         <p:txBody>
           <a:bodyPr/>
           <a:lstStyle/>
           <a:p>
-            <a:pPr lvl="0" indent="0" marL="0">
-              <a:buNone/>
-            </a:pPr>
-            <a:r>
-              <a:rPr/>
-              <a:t>Some of the Google Cloud Platform Services</a:t>
-            </a:r>
-          </a:p>
-          <a:p>
-            <a:pPr lvl="0" indent="0" marL="0">
+            <a:pPr lvl="0" indent="0" marL="0" algn="ctr">
               <a:buNone/>
             </a:pPr>
             <a:r>
@@ -8691,17 +8770,59 @@
               <a:t> in selecting the services necessary to implement clients’ data pipelines out of the “unstructured” lists of services from CSPs.</a:t>
             </a:r>
           </a:p>
-          <a:p>
-            <a:pPr lvl="0" indent="0" marL="0">
-              <a:buNone/>
-            </a:pPr>
-            <a:r>
-              <a:rPr/>
-              <a:t>Methodology for the Design of Data Platforms</a:t>
-            </a:r>
-          </a:p>
-          <a:p>
-            <a:pPr lvl="0" indent="0" marL="0">
+        </p:txBody>
+      </p:sp>
+      <p:pic>
+        <p:nvPicPr>
+          <p:cNvPr descr="https://w4bo.github.io/DOLAP-2024-DataPlat/img/overview.svg" id="0" name="Picture 1"/>
+          <p:cNvPicPr>
+            <a:picLocks noGrp="1" noChangeAspect="1"/>
+          </p:cNvPicPr>
+          <p:nvPr/>
+        </p:nvPicPr>
+        <p:blipFill>
+          <a:blip r:embed="rId2"/>
+          <a:stretch>
+            <a:fillRect/>
+          </a:stretch>
+        </p:blipFill>
+        <p:spPr bwMode="auto">
+          <a:xfrm>
+            <a:off x="457200" y="1295400"/>
+            <a:ext cx="4038600" cy="2679700"/>
+          </a:xfrm>
+          <a:prstGeom prst="rect">
+            <a:avLst/>
+          </a:prstGeom>
+          <a:noFill/>
+          <a:ln w="9525">
+            <a:noFill/>
+            <a:headEnd/>
+            <a:tailEnd/>
+          </a:ln>
+        </p:spPr>
+      </p:pic>
+      <p:sp>
+        <p:nvSpPr>
+          <p:cNvPr id="1" name="TextBox 3"/>
+          <p:cNvSpPr txBox="1"/>
+          <p:nvPr/>
+        </p:nvSpPr>
+        <p:spPr>
+          <a:xfrm>
+            <a:off x="457200" y="4076700"/>
+            <a:ext cx="4038600" cy="508000"/>
+          </a:xfrm>
+          <a:prstGeom prst="rect">
+            <a:avLst/>
+          </a:prstGeom>
+          <a:noFill/>
+        </p:spPr>
+        <p:txBody>
+          <a:bodyPr/>
+          <a:lstStyle/>
+          <a:p>
+            <a:pPr lvl="0" indent="0" marL="0" algn="ctr">
               <a:buNone/>
             </a:pPr>
             <a:r>

</xml_diff>

<commit_message>
Deploying to gh-pages from @ ManuelePasini/slides-markdown@7d8a6c345f84f4f74c924c9d75006db7abb8039c 🚀
</commit_message>
<xml_diff>
--- a/dolap_2024_slides_2version.pptx
+++ b/dolap_2024_slides_2version.pptx
@@ -3284,7 +3284,7 @@
                 <a:spLocks noGrp="1"/>
               </p:cNvSpPr>
               <p:nvPr>
-                <p:ph idx="1" sz="half"/>
+                <p:ph idx="1"/>
               </p:nvPr>
             </p:nvSpPr>
             <p:spPr/>
@@ -3309,512 +3309,70 @@
                 </a:r>
               </a:p>
               <a:p>
-                <a:pPr lvl="0" indent="0" marL="0">
-                  <a:buNone/>
-                </a:pPr>
+                <a:pPr lvl="0"/>
                 <a:r>
                   <a:rPr/>
-                  <a:t>A </a:t>
+                  <a:t>Nodes are engines from the service ecosystem and can be labelled as </a:t>
                 </a:r>
                 <a:r>
                   <a:rPr i="1"/>
-                  <a:t>directed property graph</a:t>
+                  <a:t>preferred</a:t>
                 </a:r>
                 <a:r>
                   <a:rPr/>
-                  <a:t> is a tuple </a:t>
-                </a:r>
-                <a14:m>
-                  <m:oMath xmlns:m="http://schemas.openxmlformats.org/officeDocument/2006/math">
-                    <m:r>
-                      <m:t>G</m:t>
-                    </m:r>
-                    <m:r>
-                      <m:rPr>
-                        <m:sty m:val="p"/>
-                      </m:rPr>
-                      <m:t>=</m:t>
-                    </m:r>
-                    <m:d>
-                      <m:dPr>
-                        <m:begChr m:val="("/>
-                        <m:endChr m:val=")"/>
-                        <m:sepChr m:val=""/>
-                        <m:grow/>
-                      </m:dPr>
-                      <m:e>
-                        <m:r>
-                          <m:t>N</m:t>
-                        </m:r>
-                        <m:r>
-                          <m:rPr>
-                            <m:sty m:val="p"/>
-                          </m:rPr>
-                          <m:t>,</m:t>
-                        </m:r>
-                        <m:r>
-                          <m:t>A</m:t>
-                        </m:r>
-                        <m:r>
-                          <m:rPr>
-                            <m:sty m:val="p"/>
-                          </m:rPr>
-                          <m:t>,</m:t>
-                        </m:r>
-                        <m:r>
-                          <m:t>P</m:t>
-                        </m:r>
-                        <m:r>
-                          <m:rPr>
-                            <m:sty m:val="p"/>
-                          </m:rPr>
-                          <m:t>,</m:t>
-                        </m:r>
-                        <m:r>
-                          <m:t>L</m:t>
-                        </m:r>
-                      </m:e>
-                    </m:d>
-                  </m:oMath>
-                </a14:m>
+                  <a:t>.</a:t>
+                </a:r>
+              </a:p>
+              <a:p>
+                <a:pPr lvl="1"/>
                 <a:r>
                   <a:rPr/>
-                  <a:t> where:</a:t>
+                  <a:t>Each node is characterized with a </a:t>
+                </a:r>
+                <a:r>
+                  <a:rPr i="1"/>
+                  <a:t>set of properties</a:t>
+                </a:r>
+                <a:r>
+                  <a:rPr/>
+                  <a:t> from the previously determined taxonomy.</a:t>
                 </a:r>
               </a:p>
               <a:p>
                 <a:pPr lvl="0"/>
-                <a14:m>
-                  <m:oMath xmlns:m="http://schemas.openxmlformats.org/officeDocument/2006/math">
-                    <m:r>
-                      <m:t>N</m:t>
-                    </m:r>
-                    <m:r>
-                      <m:rPr>
-                        <m:sty m:val="p"/>
-                      </m:rPr>
-                      <m:t>=</m:t>
-                    </m:r>
-                    <m:r>
-                      <m:rPr>
-                        <m:sty m:val="p"/>
-                      </m:rPr>
-                      <m:t>{</m:t>
-                    </m:r>
-                    <m:r>
-                      <m:rPr>
-                        <m:sty m:val="p"/>
-                      </m:rPr>
-                      <m:t>.</m:t>
-                    </m:r>
-                    <m:r>
-                      <m:rPr>
-                        <m:sty m:val="p"/>
-                      </m:rPr>
-                      <m:t>.</m:t>
-                    </m:r>
-                    <m:r>
-                      <m:rPr>
-                        <m:sty m:val="p"/>
-                      </m:rPr>
-                      <m:t>.</m:t>
-                    </m:r>
-                    <m:r>
-                      <m:rPr>
-                        <m:sty m:val="p"/>
-                      </m:rPr>
-                      <m:t>,</m:t>
-                    </m:r>
-                    <m:sSub>
-                      <m:e>
-                        <m:r>
-                          <m:t>n</m:t>
-                        </m:r>
-                      </m:e>
-                      <m:sub>
-                        <m:r>
-                          <m:t>i</m:t>
-                        </m:r>
-                      </m:sub>
-                    </m:sSub>
-                    <m:r>
-                      <m:rPr>
-                        <m:sty m:val="p"/>
-                      </m:rPr>
-                      <m:t>,</m:t>
-                    </m:r>
-                    <m:r>
-                      <m:rPr>
-                        <m:sty m:val="p"/>
-                      </m:rPr>
-                      <m:t>.</m:t>
-                    </m:r>
-                    <m:r>
-                      <m:rPr>
-                        <m:sty m:val="p"/>
-                      </m:rPr>
-                      <m:t>.</m:t>
-                    </m:r>
-                    <m:r>
-                      <m:rPr>
-                        <m:sty m:val="p"/>
-                      </m:rPr>
-                      <m:t>.</m:t>
-                    </m:r>
-                    <m:r>
-                      <m:rPr>
-                        <m:sty m:val="p"/>
-                      </m:rPr>
-                      <m:t>}</m:t>
-                    </m:r>
-                  </m:oMath>
-                </a14:m>
                 <a:r>
                   <a:rPr/>
-                  <a:t> is a set of </a:t>
+                  <a:t>Arcs are alternatively labeled as </a:t>
                 </a:r>
                 <a:r>
                   <a:rPr i="1"/>
-                  <a:t>nodes</a:t>
+                  <a:t>{Requires, IsCompatible}</a:t>
                 </a:r>
                 <a:r>
                   <a:rPr/>
-                  <a:t>;</a:t>
+                  <a:t>:</a:t>
                 </a:r>
               </a:p>
               <a:p>
-                <a:pPr lvl="0"/>
-                <a14:m>
-                  <m:oMath xmlns:m="http://schemas.openxmlformats.org/officeDocument/2006/math">
-                    <m:r>
-                      <m:t>A</m:t>
-                    </m:r>
-                    <m:r>
-                      <m:rPr>
-                        <m:sty m:val="p"/>
-                      </m:rPr>
-                      <m:t>=</m:t>
-                    </m:r>
-                    <m:r>
-                      <m:rPr>
-                        <m:sty m:val="p"/>
-                      </m:rPr>
-                      <m:t>{</m:t>
-                    </m:r>
-                    <m:r>
-                      <m:rPr>
-                        <m:sty m:val="p"/>
-                      </m:rPr>
-                      <m:t>.</m:t>
-                    </m:r>
-                    <m:r>
-                      <m:rPr>
-                        <m:sty m:val="p"/>
-                      </m:rPr>
-                      <m:t>.</m:t>
-                    </m:r>
-                    <m:r>
-                      <m:rPr>
-                        <m:sty m:val="p"/>
-                      </m:rPr>
-                      <m:t>.</m:t>
-                    </m:r>
-                    <m:r>
-                      <m:rPr>
-                        <m:sty m:val="p"/>
-                      </m:rPr>
-                      <m:t>,</m:t>
-                    </m:r>
-                    <m:sSub>
-                      <m:e>
-                        <m:r>
-                          <m:t>a</m:t>
-                        </m:r>
-                      </m:e>
-                      <m:sub>
-                        <m:r>
-                          <m:t>i</m:t>
-                        </m:r>
-                        <m:r>
-                          <m:t>j</m:t>
-                        </m:r>
-                      </m:sub>
-                    </m:sSub>
-                    <m:r>
-                      <m:rPr>
-                        <m:sty m:val="p"/>
-                      </m:rPr>
-                      <m:t>,</m:t>
-                    </m:r>
-                    <m:r>
-                      <m:rPr>
-                        <m:sty m:val="p"/>
-                      </m:rPr>
-                      <m:t>.</m:t>
-                    </m:r>
-                    <m:r>
-                      <m:rPr>
-                        <m:sty m:val="p"/>
-                      </m:rPr>
-                      <m:t>.</m:t>
-                    </m:r>
-                    <m:r>
-                      <m:rPr>
-                        <m:sty m:val="p"/>
-                      </m:rPr>
-                      <m:t>.</m:t>
-                    </m:r>
-                    <m:r>
-                      <m:rPr>
-                        <m:sty m:val="p"/>
-                      </m:rPr>
-                      <m:t>}</m:t>
-                    </m:r>
-                  </m:oMath>
-                </a14:m>
+                <a:pPr lvl="1"/>
+                <a:r>
+                  <a:rPr i="1"/>
+                  <a:t>Requires</a:t>
+                </a:r>
                 <a:r>
                   <a:rPr/>
-                  <a:t> is a set of </a:t>
-                </a:r>
-                <a:r>
-                  <a:rPr i="1"/>
-                  <a:t>arcs</a:t>
-                </a:r>
-                <a:r>
-                  <a:rPr/>
-                  <a:t> connecting nodes;</a:t>
+                  <a:t>: a service mandatorily relies on another;</a:t>
                 </a:r>
               </a:p>
               <a:p>
-                <a:pPr lvl="0"/>
-                <a14:m>
-                  <m:oMath xmlns:m="http://schemas.openxmlformats.org/officeDocument/2006/math">
-                    <m:r>
-                      <m:t>P</m:t>
-                    </m:r>
-                    <m:r>
-                      <m:rPr>
-                        <m:sty m:val="p"/>
-                      </m:rPr>
-                      <m:t>=</m:t>
-                    </m:r>
-                    <m:r>
-                      <m:rPr>
-                        <m:sty m:val="p"/>
-                      </m:rPr>
-                      <m:t>{</m:t>
-                    </m:r>
-                    <m:r>
-                      <m:rPr>
-                        <m:sty m:val="p"/>
-                      </m:rPr>
-                      <m:t>.</m:t>
-                    </m:r>
-                    <m:r>
-                      <m:rPr>
-                        <m:sty m:val="p"/>
-                      </m:rPr>
-                      <m:t>.</m:t>
-                    </m:r>
-                    <m:r>
-                      <m:rPr>
-                        <m:sty m:val="p"/>
-                      </m:rPr>
-                      <m:t>.</m:t>
-                    </m:r>
-                    <m:r>
-                      <m:rPr>
-                        <m:sty m:val="p"/>
-                      </m:rPr>
-                      <m:t>,</m:t>
-                    </m:r>
-                    <m:d>
-                      <m:dPr>
-                        <m:begChr m:val="("/>
-                        <m:endChr m:val=")"/>
-                        <m:sepChr m:val=""/>
-                        <m:grow/>
-                      </m:dPr>
-                      <m:e>
-                        <m:r>
-                          <m:t>h</m:t>
-                        </m:r>
-                        <m:r>
-                          <m:rPr>
-                            <m:sty m:val="p"/>
-                          </m:rPr>
-                          <m:t>,</m:t>
-                        </m:r>
-                        <m:r>
-                          <m:t>v</m:t>
-                        </m:r>
-                      </m:e>
-                    </m:d>
-                    <m:r>
-                      <m:rPr>
-                        <m:sty m:val="p"/>
-                      </m:rPr>
-                      <m:t>,</m:t>
-                    </m:r>
-                    <m:r>
-                      <m:rPr>
-                        <m:sty m:val="p"/>
-                      </m:rPr>
-                      <m:t>.</m:t>
-                    </m:r>
-                    <m:r>
-                      <m:rPr>
-                        <m:sty m:val="p"/>
-                      </m:rPr>
-                      <m:t>.</m:t>
-                    </m:r>
-                    <m:r>
-                      <m:rPr>
-                        <m:sty m:val="p"/>
-                      </m:rPr>
-                      <m:t>.</m:t>
-                    </m:r>
-                    <m:r>
-                      <m:rPr>
-                        <m:sty m:val="p"/>
-                      </m:rPr>
-                      <m:t>}</m:t>
-                    </m:r>
-                  </m:oMath>
-                </a14:m>
-                <a:r>
-                  <a:rPr/>
-                  <a:t> is a set of key-value </a:t>
-                </a:r>
-                <a:r>
-                  <a:rPr i="1"/>
-                  <a:t>properties</a:t>
-                </a:r>
-                <a:r>
-                  <a:rPr/>
-                  <a:t>;</a:t>
-                </a:r>
-              </a:p>
-              <a:p>
-                <a:pPr lvl="0"/>
-                <a14:m>
-                  <m:oMath xmlns:m="http://schemas.openxmlformats.org/officeDocument/2006/math">
-                    <m:r>
-                      <m:t>L</m:t>
-                    </m:r>
-                  </m:oMath>
-                </a14:m>
-                <a:r>
-                  <a:rPr/>
-                  <a:t> is a set of </a:t>
-                </a:r>
-                <a:r>
-                  <a:rPr i="1"/>
-                  <a:t>labels</a:t>
-                </a:r>
-                <a:r>
-                  <a:rPr/>
-                  <a:t>.</a:t>
-                </a:r>
-              </a:p>
-              <a:p>
-                <a:pPr lvl="0" indent="0" marL="0">
-                  <a:buNone/>
-                </a:pPr>
-                <a:r>
-                  <a:rPr/>
-                  <a:t>Nodes are engines from the service ecosystem and can be labelled as </a:t>
-                </a:r>
-                <a:r>
-                  <a:rPr i="1"/>
-                  <a:t>preferred</a:t>
-                </a:r>
-                <a:r>
-                  <a:rPr/>
-                  <a:t>.</a:t>
-                </a:r>
-              </a:p>
-              <a:p>
-                <a:pPr lvl="0"/>
-                <a:r>
-                  <a:rPr/>
-                  <a:t>Each node is characterized with a </a:t>
-                </a:r>
-                <a:r>
-                  <a:rPr i="1"/>
-                  <a:t>set of properties</a:t>
-                </a:r>
-                <a:r>
-                  <a:rPr/>
-                  <a:t> from the previously determined taxonomy.</a:t>
-                </a:r>
-              </a:p>
-              <a:p>
-                <a:pPr lvl="0" indent="0" marL="0">
-                  <a:buNone/>
-                </a:pPr>
-                <a:r>
-                  <a:rPr/>
-                  <a:t>Arcs are alternatively labeled as </a:t>
-                </a:r>
-                <a:r>
-                  <a:rPr i="1"/>
-                  <a:t>{Requires, IsCompatible}</a:t>
-                </a:r>
-                <a:r>
-                  <a:rPr/>
-                  <a:t>:</a:t>
-                </a:r>
-              </a:p>
-              <a:p>
-                <a:pPr lvl="0"/>
-                <a:r>
-                  <a:rPr i="1"/>
-                  <a:t>Requires</a:t>
-                </a:r>
-                <a:r>
-                  <a:rPr/>
-                  <a:t>: represents whether a service mandatorily relies on another;</a:t>
-                </a:r>
-              </a:p>
-              <a:p>
-                <a:pPr lvl="0"/>
+                <a:pPr lvl="1"/>
                 <a:r>
                   <a:rPr i="1"/>
                   <a:t>IsCompatible</a:t>
                 </a:r>
                 <a:r>
                   <a:rPr/>
-                  <a:t>: represents whether a service natively interfaces with another.</a:t>
-                </a:r>
-              </a:p>
-            </p:txBody>
-          </p:sp>
-        </mc:Choice>
-      </mc:AlternateContent>
-      <mc:AlternateContent xmlns:mc="http://schemas.openxmlformats.org/markup-compatibility/2006">
-        <mc:Choice xmlns:a14="http://schemas.microsoft.com/office/drawing/2010/main" Requires="a14">
-          <p:sp>
-            <p:nvSpPr>
-              <p:cNvPr id="4" name="Content Placeholder 3"/>
-              <p:cNvSpPr>
-                <a:spLocks noGrp="1"/>
-              </p:cNvSpPr>
-              <p:nvPr>
-                <p:ph idx="2" sz="half"/>
-              </p:nvPr>
-            </p:nvSpPr>
-            <p:spPr/>
-            <p:txBody>
-              <a:bodyPr/>
-              <a:lstStyle/>
-              <a:p>
-                <a:pPr lvl="0" indent="0" marL="1270000">
-                  <a:buNone/>
-                </a:pPr>
-                <a:r>
-                  <a:rPr sz="2000" b="1"/>
-                  <a:t>Example</a:t>
+                  <a:t>: a service natively interfaces with another.</a:t>
                 </a:r>
               </a:p>
               <a:p>
@@ -3836,6 +3394,15 @@
                 </a:r>
               </a:p>
               <a:p>
+                <a:pPr lvl="0" indent="0" marL="1270000">
+                  <a:buNone/>
+                </a:pPr>
+                <a:r>
+                  <a:rPr sz="2000" b="1"/>
+                  <a:t>Example</a:t>
+                </a:r>
+              </a:p>
+              <a:p>
                 <a:pPr lvl="0"/>
                 <a:r>
                   <a:rPr sz="2000" i="1"/>
@@ -3895,21 +3462,6 @@
                 <a:r>
                   <a:rPr sz="2000"/>
                   <a:t> since it is deployed on it.</a:t>
-                </a:r>
-              </a:p>
-              <a:p>
-                <a:pPr lvl="0" indent="0" marL="1270000">
-                  <a:buNone/>
-                </a:pPr>
-                <a:r>
-                  <a:rPr sz="2000">
-                    <a:latin typeface="Courier"/>
-                  </a:rPr>
-                  <a:t>GeoServer</a:t>
-                </a:r>
-                <a:r>
-                  <a:rPr sz="2000"/>
-                  <a:t> might be characterized by the following properties:</a:t>
                 </a:r>
               </a:p>
               <a:p>
@@ -4664,51 +4216,6 @@
                   <a:t>.</a:t>
                 </a:r>
               </a:p>
-              <a:p>
-                <a:pPr lvl="0"/>
-                <a:r>
-                  <a:rPr/>
-                  <a:t>Decompose the data flows into </a:t>
-                </a:r>
-                <a:r>
-                  <a:rPr i="1"/>
-                  <a:t>agents</a:t>
-                </a:r>
-                <a:r>
-                  <a:rPr/>
-                  <a:t>, </a:t>
-                </a:r>
-                <a:r>
-                  <a:rPr i="1"/>
-                  <a:t>processes</a:t>
-                </a:r>
-                <a:r>
-                  <a:rPr/>
-                  <a:t>, and </a:t>
-                </a:r>
-                <a:r>
-                  <a:rPr i="1"/>
-                  <a:t>repositories</a:t>
-                </a:r>
-                <a:r>
-                  <a:rPr/>
-                  <a:t>:</a:t>
-                </a:r>
-              </a:p>
-              <a:p>
-                <a:pPr lvl="1"/>
-                <a:r>
-                  <a:rPr/>
-                  <a:t>Start from an aggregated overview;</a:t>
-                </a:r>
-              </a:p>
-              <a:p>
-                <a:pPr lvl="1"/>
-                <a:r>
-                  <a:rPr/>
-                  <a:t>Recursively split candidate processes/repositories until each of them is characterized by homogeneous tags.</a:t>
-                </a:r>
-              </a:p>
             </p:txBody>
           </p:sp>
         </mc:Choice>
@@ -4764,7 +4271,7 @@
             </a:r>
             <a:r>
               <a:rPr sz="2000"/>
-              <a:t> streams data into the platform while </a:t>
+              <a:t> streams data into the platform; </a:t>
             </a:r>
             <a:r>
               <a:rPr sz="2000">
@@ -4797,7 +4304,7 @@
             </a:r>
             <a:r>
               <a:rPr sz="2000"/>
-              <a:t> cannot be grouped, they contain heterogeneous data types.</a:t>
+              <a:t> contain heterogeneous data types.</a:t>
             </a:r>
           </a:p>
         </p:txBody>
@@ -5850,17 +5357,7 @@
                 </a:r>
                 <a:r>
                   <a:rPr sz="2000"/>
-                  <a:t> since the former is natively capable of managing geographical raster images (while </a:t>
-                </a:r>
-                <a:r>
-                  <a:rPr sz="2000">
-                    <a:latin typeface="Courier"/>
-                  </a:rPr>
-                  <a:t>S3</a:t>
-                </a:r>
-                <a:r>
-                  <a:rPr sz="2000"/>
-                  <a:t> would only provide storage for the images).</a:t>
+                  <a:t> since the former is natively capable of managing geographical raster images.</a:t>
                 </a:r>
               </a:p>
             </p:txBody>
@@ -5942,7 +5439,7 @@
             </a:r>
             <a:r>
               <a:rPr/>
-              <a:t> is composed of the union of the nodes, and the union of the arcs plus additional arcs </a:t>
+              <a:t> is composed of the union of the graphs plus additional arcs </a:t>
             </a:r>
             <a:r>
               <a:rPr i="1"/>
@@ -6033,7 +5530,7 @@
             </a:r>
             <a:r>
               <a:rPr sz="2000"/>
-              <a:t> can be discarded a priori since they are not reachable (i.e., they are neither candidate implementations nor required by other services).</a:t>
+              <a:t> can be discarded a priori since they are not reachable.</a:t>
             </a:r>
           </a:p>
         </p:txBody>
@@ -6085,1678 +5582,127 @@
           </a:p>
         </p:txBody>
       </p:sp>
-      <mc:AlternateContent xmlns:mc="http://schemas.openxmlformats.org/markup-compatibility/2006">
-        <mc:Choice xmlns:a14="http://schemas.microsoft.com/office/drawing/2010/main" Requires="a14">
-          <p:sp>
-            <p:nvSpPr>
-              <p:cNvPr id="3" name="Content Placeholder 2"/>
-              <p:cNvSpPr>
-                <a:spLocks noGrp="1"/>
-              </p:cNvSpPr>
-              <p:nvPr>
-                <p:ph idx="1" sz="half"/>
-              </p:nvPr>
-            </p:nvSpPr>
-            <p:spPr/>
-            <p:txBody>
-              <a:bodyPr/>
-              <a:lstStyle/>
-              <a:p>
-                <a:pPr lvl="0" indent="0" marL="0">
-                  <a:buNone/>
-                </a:pPr>
-                <a:r>
-                  <a:rPr/>
-                  <a:t>Out of all matching services, only some of them must be selected:</a:t>
-                </a:r>
-              </a:p>
-              <a:p>
-                <a:pPr lvl="0" indent="-342900" marL="342900">
-                  <a:buAutoNum type="arabicPeriod"/>
-                </a:pPr>
-                <a:r>
-                  <a:rPr/>
-                  <a:t>The amount of </a:t>
-                </a:r>
-                <a:r>
-                  <a:rPr i="1"/>
-                  <a:t>selected services is minimized</a:t>
-                </a:r>
-                <a:r>
-                  <a:rPr/>
-                  <a:t>.</a:t>
-                </a:r>
-              </a:p>
-              <a:p>
-                <a:pPr lvl="0" indent="-342900" marL="342900">
-                  <a:buAutoNum type="arabicPeriod"/>
-                </a:pPr>
-                <a:r>
-                  <a:rPr i="1"/>
-                  <a:t>Coverage</a:t>
-                </a:r>
-                <a:r>
-                  <a:rPr/>
-                  <a:t>: all processes and repositories in the DFD must be covered.</a:t>
-                </a:r>
-              </a:p>
-              <a:p>
-                <a:pPr lvl="0" indent="-342900" marL="342900">
-                  <a:buAutoNum type="arabicPeriod"/>
-                </a:pPr>
-                <a:r>
-                  <a:rPr i="1"/>
-                  <a:t>Dependency</a:t>
-                </a:r>
-                <a:r>
-                  <a:rPr/>
-                  <a:t>: if a service is selected, all its required services must be selected too.</a:t>
-                </a:r>
-              </a:p>
-              <a:p>
-                <a:pPr lvl="0" indent="-342900" marL="342900">
-                  <a:buAutoNum type="arabicPeriod"/>
-                </a:pPr>
-                <a:r>
-                  <a:rPr i="1"/>
-                  <a:t>Compatibility</a:t>
-                </a:r>
-                <a:r>
-                  <a:rPr/>
-                  <a:t>: a service can be selected only if it is compatible with the services selected for the previous/following nodes in the DFD.</a:t>
-                </a:r>
-              </a:p>
-              <a:p>
-                <a:pPr lvl="0" indent="-342900" marL="342900">
-                  <a:buAutoNum type="arabicPeriod"/>
-                </a:pPr>
-                <a:r>
-                  <a:rPr i="1"/>
-                  <a:t>Preference</a:t>
-                </a:r>
-                <a:r>
-                  <a:rPr/>
-                  <a:t>: preferred services should have more chances to be selected.</a:t>
-                </a:r>
-              </a:p>
-              <a:p>
-                <a:pPr lvl="0" indent="0" marL="0">
-                  <a:buNone/>
-                </a:pPr>
-                <a:r>
-                  <a:rPr/>
-                  <a:t>This is a </a:t>
-                </a:r>
-                <a:r>
-                  <a:rPr i="1"/>
-                  <a:t>facility location optimization</a:t>
-                </a:r>
-                <a:r>
-                  <a:rPr/>
-                  <a:t> linear programming problem (available on </a:t>
-                </a:r>
-                <a:r>
-                  <a:rPr>
-                    <a:hlinkClick r:id="rId2"/>
-                  </a:rPr>
-                  <a:t>Github</a:t>
-                </a:r>
-                <a:r>
-                  <a:rPr/>
-                  <a:t> w/ Python + CPlex library).</a:t>
-                </a:r>
-              </a:p>
-              <a:p>
-                <a:pPr lvl="0" indent="0" marL="0">
-                  <a:buNone/>
-                </a:pPr>
-                <a:r>
-                  <a:rPr/>
-                  <a:t>Given a matched graph </a:t>
-                </a:r>
-                <a14:m>
-                  <m:oMath xmlns:m="http://schemas.openxmlformats.org/officeDocument/2006/math">
-                    <m:sSup>
-                      <m:e>
-                        <m:r>
-                          <m:t>G</m:t>
-                        </m:r>
-                      </m:e>
-                      <m:sup>
-                        <m:r>
-                          <m:t>M</m:t>
-                        </m:r>
-                      </m:sup>
-                    </m:sSup>
-                    <m:r>
-                      <m:rPr>
-                        <m:sty m:val="p"/>
-                      </m:rPr>
-                      <m:t>=</m:t>
-                    </m:r>
-                    <m:d>
-                      <m:dPr>
-                        <m:begChr m:val="("/>
-                        <m:endChr m:val=")"/>
-                        <m:sepChr m:val=""/>
-                        <m:grow/>
-                      </m:dPr>
-                      <m:e>
-                        <m:r>
-                          <m:t>N</m:t>
-                        </m:r>
-                        <m:r>
-                          <m:rPr>
-                            <m:sty m:val="p"/>
-                          </m:rPr>
-                          <m:t>,</m:t>
-                        </m:r>
-                        <m:r>
-                          <m:t>A</m:t>
-                        </m:r>
-                        <m:r>
-                          <m:rPr>
-                            <m:sty m:val="p"/>
-                          </m:rPr>
-                          <m:t>,</m:t>
-                        </m:r>
-                        <m:r>
-                          <m:t>P</m:t>
-                        </m:r>
-                        <m:r>
-                          <m:rPr>
-                            <m:sty m:val="p"/>
-                          </m:rPr>
-                          <m:t>,</m:t>
-                        </m:r>
-                        <m:r>
-                          <m:t>L</m:t>
-                        </m:r>
-                      </m:e>
-                    </m:d>
-                  </m:oMath>
-                </a14:m>
-                <a:r>
-                  <a:rPr/>
-                  <a:t> e </a:t>
-                </a:r>
-                <a14:m>
-                  <m:oMath xmlns:m="http://schemas.openxmlformats.org/officeDocument/2006/math">
-                    <m:m>
-                      <m:mPr>
-                        <m:baseJc m:val="center"/>
-                        <m:plcHide m:val="on"/>
-                        <m:mcs>
-                          <m:mc>
-                            <m:mcPr>
-                              <m:mcJc m:val="right"/>
-                              <m:count m:val="1"/>
-                            </m:mcPr>
-                          </m:mc>
-                          <m:mc>
-                            <m:mcPr>
-                              <m:mcJc m:val="left"/>
-                              <m:count m:val="1"/>
-                            </m:mcPr>
-                          </m:mc>
-                        </m:mcs>
-                      </m:mPr>
-                      <m:mr>
-                        <m:e>
-                          <m:r>
-                            <m:t>m</m:t>
-                          </m:r>
-                          <m:r>
-                            <m:t>i</m:t>
-                          </m:r>
-                          <m:r>
-                            <m:t>n</m:t>
-                          </m:r>
-                        </m:e>
-                        <m:e>
-                          <m:nary>
-                            <m:naryPr>
-                              <m:chr m:val="∑"/>
-                              <m:limLoc m:val="undOvr"/>
-                              <m:subHide m:val="off"/>
-                              <m:supHide m:val="on"/>
-                            </m:naryPr>
-                            <m:sub>
-                              <m:r>
-                                <m:t>i</m:t>
-                              </m:r>
-                            </m:sub>
-                            <m:sup>
-                              <m:r>
-                                <m:t>​</m:t>
-                              </m:r>
-                            </m:sup>
-                            <m:e>
-                              <m:sSub>
-                                <m:e>
-                                  <m:r>
-                                    <m:t>w</m:t>
-                                  </m:r>
-                                </m:e>
-                                <m:sub>
-                                  <m:r>
-                                    <m:t>i</m:t>
-                                  </m:r>
-                                </m:sub>
-                              </m:sSub>
-                            </m:e>
-                          </m:nary>
-                          <m:sSub>
-                            <m:e>
-                              <m:r>
-                                <m:t>s</m:t>
-                              </m:r>
-                            </m:e>
-                            <m:sub>
-                              <m:r>
-                                <m:t>i</m:t>
-                              </m:r>
-                            </m:sub>
-                          </m:sSub>
-                        </m:e>
-                      </m:mr>
-                      <m:mr>
-                        <m:e>
-                          <m:r>
-                            <m:t>s</m:t>
-                          </m:r>
-                          <m:r>
-                            <m:rPr>
-                              <m:sty m:val="p"/>
-                            </m:rPr>
-                            <m:t>.</m:t>
-                          </m:r>
-                          <m:r>
-                            <m:t>t</m:t>
-                          </m:r>
-                          <m:r>
-                            <m:rPr>
-                              <m:sty m:val="p"/>
-                            </m:rPr>
-                            <m:t>.</m:t>
-                          </m:r>
-                          <m:r>
-                            <m:t> </m:t>
-                          </m:r>
-                        </m:e>
-                        <m:e>
-                          <m:sSub>
-                            <m:e>
-                              <m:r>
-                                <m:t>s</m:t>
-                              </m:r>
-                            </m:e>
-                            <m:sub>
-                              <m:r>
-                                <m:t>i</m:t>
-                              </m:r>
-                            </m:sub>
-                          </m:sSub>
-                          <m:r>
-                            <m:rPr>
-                              <m:sty m:val="p"/>
-                            </m:rPr>
-                            <m:t>∈</m:t>
-                          </m:r>
-                          <m:r>
-                            <m:rPr>
-                              <m:sty m:val="p"/>
-                            </m:rPr>
-                            <m:t>{</m:t>
-                          </m:r>
-                          <m:r>
-                            <m:t>0</m:t>
-                          </m:r>
-                          <m:r>
-                            <m:rPr>
-                              <m:sty m:val="p"/>
-                            </m:rPr>
-                            <m:t>,</m:t>
-                          </m:r>
-                          <m:r>
-                            <m:t>1</m:t>
-                          </m:r>
-                          <m:r>
-                            <m:rPr>
-                              <m:sty m:val="p"/>
-                            </m:rPr>
-                            <m:t>}</m:t>
-                          </m:r>
-                          <m:r>
-                            <m:t> </m:t>
-                          </m:r>
-                          <m:r>
-                            <m:rPr>
-                              <m:sty m:val="p"/>
-                            </m:rPr>
-                            <m:t>∀</m:t>
-                          </m:r>
-                          <m:sSub>
-                            <m:e>
-                              <m:r>
-                                <m:t>n</m:t>
-                              </m:r>
-                            </m:e>
-                            <m:sub>
-                              <m:r>
-                                <m:t>i</m:t>
-                              </m:r>
-                            </m:sub>
-                          </m:sSub>
-                          <m:r>
-                            <m:rPr>
-                              <m:sty m:val="p"/>
-                            </m:rPr>
-                            <m:t>∈</m:t>
-                          </m:r>
-                          <m:r>
-                            <m:t>N</m:t>
-                          </m:r>
-                          <m:r>
-                            <m:rPr>
-                              <m:sty m:val="p"/>
-                            </m:rPr>
-                            <m:t>,</m:t>
-                          </m:r>
-                          <m:r>
-                            <m:t>l</m:t>
-                          </m:r>
-                          <m:r>
-                            <m:t>a</m:t>
-                          </m:r>
-                          <m:r>
-                            <m:t>b</m:t>
-                          </m:r>
-                          <m:r>
-                            <m:t>e</m:t>
-                          </m:r>
-                          <m:r>
-                            <m:t>l</m:t>
-                          </m:r>
-                          <m:d>
-                            <m:dPr>
-                              <m:begChr m:val="("/>
-                              <m:endChr m:val=")"/>
-                              <m:sepChr m:val=""/>
-                              <m:grow/>
-                            </m:dPr>
-                            <m:e>
-                              <m:sSub>
-                                <m:e>
-                                  <m:r>
-                                    <m:t>n</m:t>
-                                  </m:r>
-                                </m:e>
-                                <m:sub>
-                                  <m:r>
-                                    <m:t>i</m:t>
-                                  </m:r>
-                                </m:sub>
-                              </m:sSub>
-                            </m:e>
-                          </m:d>
-                          <m:r>
-                            <m:rPr>
-                              <m:sty m:val="p"/>
-                            </m:rPr>
-                            <m:t>=</m:t>
-                          </m:r>
-                          <m:r>
-                            <m:t>S</m:t>
-                          </m:r>
-                          <m:r>
-                            <m:t>e</m:t>
-                          </m:r>
-                          <m:r>
-                            <m:t>r</m:t>
-                          </m:r>
-                          <m:r>
-                            <m:t>v</m:t>
-                          </m:r>
-                          <m:r>
-                            <m:t>i</m:t>
-                          </m:r>
-                          <m:r>
-                            <m:t>c</m:t>
-                          </m:r>
-                          <m:r>
-                            <m:t>e</m:t>
-                          </m:r>
-                        </m:e>
-                      </m:mr>
-                      <m:mr>
-                        <m:e/>
-                        <m:e>
-                          <m:sSub>
-                            <m:e>
-                              <m:r>
-                                <m:t>s</m:t>
-                              </m:r>
-                            </m:e>
-                            <m:sub>
-                              <m:r>
-                                <m:t>i</m:t>
-                              </m:r>
-                              <m:r>
-                                <m:t>j</m:t>
-                              </m:r>
-                            </m:sub>
-                          </m:sSub>
-                          <m:r>
-                            <m:rPr>
-                              <m:sty m:val="p"/>
-                            </m:rPr>
-                            <m:t>∈</m:t>
-                          </m:r>
-                          <m:r>
-                            <m:rPr>
-                              <m:sty m:val="p"/>
-                            </m:rPr>
-                            <m:t>{</m:t>
-                          </m:r>
-                          <m:r>
-                            <m:t>0</m:t>
-                          </m:r>
-                          <m:r>
-                            <m:rPr>
-                              <m:sty m:val="p"/>
-                            </m:rPr>
-                            <m:t>,</m:t>
-                          </m:r>
-                          <m:r>
-                            <m:t>1</m:t>
-                          </m:r>
-                          <m:r>
-                            <m:rPr>
-                              <m:sty m:val="p"/>
-                            </m:rPr>
-                            <m:t>}</m:t>
-                          </m:r>
-                          <m:r>
-                            <m:t> </m:t>
-                          </m:r>
-                          <m:r>
-                            <m:rPr>
-                              <m:sty m:val="p"/>
-                            </m:rPr>
-                            <m:t>∀</m:t>
-                          </m:r>
-                          <m:sSub>
-                            <m:e>
-                              <m:r>
-                                <m:t>a</m:t>
-                              </m:r>
-                            </m:e>
-                            <m:sub>
-                              <m:r>
-                                <m:t>i</m:t>
-                              </m:r>
-                              <m:r>
-                                <m:t>j</m:t>
-                              </m:r>
-                            </m:sub>
-                          </m:sSub>
-                          <m:r>
-                            <m:rPr>
-                              <m:sty m:val="p"/>
-                            </m:rPr>
-                            <m:t>∈</m:t>
-                          </m:r>
-                          <m:r>
-                            <m:t>A</m:t>
-                          </m:r>
-                          <m:r>
-                            <m:rPr>
-                              <m:sty m:val="p"/>
-                            </m:rPr>
-                            <m:t>,</m:t>
-                          </m:r>
-                          <m:r>
-                            <m:t>l</m:t>
-                          </m:r>
-                          <m:r>
-                            <m:t>a</m:t>
-                          </m:r>
-                          <m:r>
-                            <m:t>b</m:t>
-                          </m:r>
-                          <m:r>
-                            <m:t>e</m:t>
-                          </m:r>
-                          <m:r>
-                            <m:t>l</m:t>
-                          </m:r>
-                          <m:d>
-                            <m:dPr>
-                              <m:begChr m:val="("/>
-                              <m:endChr m:val=")"/>
-                              <m:sepChr m:val=""/>
-                              <m:grow/>
-                            </m:dPr>
-                            <m:e>
-                              <m:sSub>
-                                <m:e>
-                                  <m:r>
-                                    <m:t>a</m:t>
-                                  </m:r>
-                                </m:e>
-                                <m:sub>
-                                  <m:r>
-                                    <m:t>i</m:t>
-                                  </m:r>
-                                  <m:r>
-                                    <m:t>j</m:t>
-                                  </m:r>
-                                </m:sub>
-                              </m:sSub>
-                            </m:e>
-                          </m:d>
-                          <m:r>
-                            <m:rPr>
-                              <m:sty m:val="p"/>
-                            </m:rPr>
-                            <m:t>=</m:t>
-                          </m:r>
-                          <m:r>
-                            <m:t>I</m:t>
-                          </m:r>
-                          <m:r>
-                            <m:t>m</m:t>
-                          </m:r>
-                          <m:r>
-                            <m:t>p</m:t>
-                          </m:r>
-                          <m:r>
-                            <m:t>l</m:t>
-                          </m:r>
-                          <m:r>
-                            <m:t>e</m:t>
-                          </m:r>
-                          <m:r>
-                            <m:t>m</m:t>
-                          </m:r>
-                          <m:r>
-                            <m:t>e</m:t>
-                          </m:r>
-                          <m:r>
-                            <m:t>n</m:t>
-                          </m:r>
-                          <m:r>
-                            <m:t>t</m:t>
-                          </m:r>
-                          <m:r>
-                            <m:t>e</m:t>
-                          </m:r>
-                          <m:r>
-                            <m:t>d</m:t>
-                          </m:r>
-                          <m:r>
-                            <m:t>B</m:t>
-                          </m:r>
-                          <m:r>
-                            <m:t>y</m:t>
-                          </m:r>
-                        </m:e>
-                      </m:mr>
-                      <m:mr>
-                        <m:e/>
-                        <m:e>
-                          <m:sSub>
-                            <m:e>
-                              <m:r>
-                                <m:t>s</m:t>
-                              </m:r>
-                            </m:e>
-                            <m:sub>
-                              <m:r>
-                                <m:t>j</m:t>
-                              </m:r>
-                            </m:sub>
-                          </m:sSub>
-                          <m:r>
-                            <m:rPr>
-                              <m:sty m:val="p"/>
-                            </m:rPr>
-                            <m:t>≥</m:t>
-                          </m:r>
-                          <m:sSub>
-                            <m:e>
-                              <m:r>
-                                <m:t>s</m:t>
-                              </m:r>
-                            </m:e>
-                            <m:sub>
-                              <m:r>
-                                <m:t>i</m:t>
-                              </m:r>
-                              <m:r>
-                                <m:t>j</m:t>
-                              </m:r>
-                            </m:sub>
-                          </m:sSub>
-                          <m:r>
-                            <m:t> </m:t>
-                          </m:r>
-                          <m:r>
-                            <m:rPr>
-                              <m:sty m:val="p"/>
-                            </m:rPr>
-                            <m:t>∀</m:t>
-                          </m:r>
-                          <m:sSub>
-                            <m:e>
-                              <m:r>
-                                <m:t>s</m:t>
-                              </m:r>
-                            </m:e>
-                            <m:sub>
-                              <m:r>
-                                <m:t>i</m:t>
-                              </m:r>
-                              <m:r>
-                                <m:t>j</m:t>
-                              </m:r>
-                            </m:sub>
-                          </m:sSub>
-                        </m:e>
-                      </m:mr>
-                      <m:mr>
-                        <m:e/>
-                        <m:e>
-                          <m:nary>
-                            <m:naryPr>
-                              <m:chr m:val="∑"/>
-                              <m:limLoc m:val="undOvr"/>
-                              <m:subHide m:val="off"/>
-                              <m:supHide m:val="on"/>
-                            </m:naryPr>
-                            <m:sub>
-                              <m:r>
-                                <m:t>j</m:t>
-                              </m:r>
-                              <m:r>
-                                <m:rPr>
-                                  <m:sty m:val="p"/>
-                                </m:rPr>
-                                <m:t>,</m:t>
-                              </m:r>
-                              <m:r>
-                                <m:t>l</m:t>
-                              </m:r>
-                              <m:r>
-                                <m:t>a</m:t>
-                              </m:r>
-                              <m:r>
-                                <m:t>b</m:t>
-                              </m:r>
-                              <m:r>
-                                <m:t>e</m:t>
-                              </m:r>
-                              <m:r>
-                                <m:t>l</m:t>
-                              </m:r>
-                              <m:d>
-                                <m:dPr>
-                                  <m:begChr m:val="("/>
-                                  <m:endChr m:val=")"/>
-                                  <m:sepChr m:val=""/>
-                                  <m:grow/>
-                                </m:dPr>
-                                <m:e>
-                                  <m:sSub>
-                                    <m:e>
-                                      <m:r>
-                                        <m:t>a</m:t>
-                                      </m:r>
-                                    </m:e>
-                                    <m:sub>
-                                      <m:r>
-                                        <m:t>i</m:t>
-                                      </m:r>
-                                      <m:r>
-                                        <m:t>j</m:t>
-                                      </m:r>
-                                    </m:sub>
-                                  </m:sSub>
-                                </m:e>
-                              </m:d>
-                              <m:r>
-                                <m:rPr>
-                                  <m:sty m:val="p"/>
-                                </m:rPr>
-                                <m:t>=</m:t>
-                              </m:r>
-                              <m:r>
-                                <m:t>I</m:t>
-                              </m:r>
-                              <m:r>
-                                <m:t>m</m:t>
-                              </m:r>
-                              <m:r>
-                                <m:t>p</m:t>
-                              </m:r>
-                              <m:r>
-                                <m:t>l</m:t>
-                              </m:r>
-                              <m:r>
-                                <m:t>e</m:t>
-                              </m:r>
-                              <m:r>
-                                <m:t>m</m:t>
-                              </m:r>
-                              <m:r>
-                                <m:t>e</m:t>
-                              </m:r>
-                              <m:r>
-                                <m:t>n</m:t>
-                              </m:r>
-                              <m:r>
-                                <m:t>t</m:t>
-                              </m:r>
-                              <m:r>
-                                <m:t>e</m:t>
-                              </m:r>
-                              <m:r>
-                                <m:t>d</m:t>
-                              </m:r>
-                              <m:r>
-                                <m:t>B</m:t>
-                              </m:r>
-                              <m:r>
-                                <m:t>y</m:t>
-                              </m:r>
-                              <m:r>
-                                <m:rPr>
-                                  <m:sty m:val="p"/>
-                                </m:rPr>
-                                <m:t>,</m:t>
-                              </m:r>
-                              <m:sSub>
-                                <m:e>
-                                  <m:r>
-                                    <m:t>a</m:t>
-                                  </m:r>
-                                </m:e>
-                                <m:sub>
-                                  <m:r>
-                                    <m:t>i</m:t>
-                                  </m:r>
-                                  <m:r>
-                                    <m:t>j</m:t>
-                                  </m:r>
-                                </m:sub>
-                              </m:sSub>
-                              <m:r>
-                                <m:rPr>
-                                  <m:sty m:val="p"/>
-                                </m:rPr>
-                                <m:t>∈</m:t>
-                              </m:r>
-                              <m:r>
-                                <m:t>A</m:t>
-                              </m:r>
-                            </m:sub>
-                            <m:sup>
-                              <m:r>
-                                <m:t>​</m:t>
-                              </m:r>
-                            </m:sup>
-                            <m:e>
-                              <m:sSub>
-                                <m:e>
-                                  <m:r>
-                                    <m:t>s</m:t>
-                                  </m:r>
-                                </m:e>
-                                <m:sub>
-                                  <m:r>
-                                    <m:t>i</m:t>
-                                  </m:r>
-                                  <m:r>
-                                    <m:t>j</m:t>
-                                  </m:r>
-                                </m:sub>
-                              </m:sSub>
-                            </m:e>
-                          </m:nary>
-                          <m:r>
-                            <m:rPr>
-                              <m:sty m:val="p"/>
-                            </m:rPr>
-                            <m:t>=</m:t>
-                          </m:r>
-                          <m:r>
-                            <m:t>1</m:t>
-                          </m:r>
-                          <m:r>
-                            <m:t> </m:t>
-                          </m:r>
-                          <m:r>
-                            <m:rPr>
-                              <m:sty m:val="p"/>
-                            </m:rPr>
-                            <m:t>∀</m:t>
-                          </m:r>
-                          <m:sSub>
-                            <m:e>
-                              <m:r>
-                                <m:t>n</m:t>
-                              </m:r>
-                            </m:e>
-                            <m:sub>
-                              <m:r>
-                                <m:t>i</m:t>
-                              </m:r>
-                            </m:sub>
-                          </m:sSub>
-                          <m:r>
-                            <m:rPr>
-                              <m:sty m:val="p"/>
-                            </m:rPr>
-                            <m:t>∈</m:t>
-                          </m:r>
-                          <m:r>
-                            <m:t>N</m:t>
-                          </m:r>
-                          <m:r>
-                            <m:rPr>
-                              <m:sty m:val="p"/>
-                            </m:rPr>
-                            <m:t>,</m:t>
-                          </m:r>
-                          <m:r>
-                            <m:t>l</m:t>
-                          </m:r>
-                          <m:r>
-                            <m:t>a</m:t>
-                          </m:r>
-                          <m:r>
-                            <m:t>b</m:t>
-                          </m:r>
-                          <m:r>
-                            <m:t>e</m:t>
-                          </m:r>
-                          <m:r>
-                            <m:t>l</m:t>
-                          </m:r>
-                          <m:d>
-                            <m:dPr>
-                              <m:begChr m:val="("/>
-                              <m:endChr m:val=")"/>
-                              <m:sepChr m:val=""/>
-                              <m:grow/>
-                            </m:dPr>
-                            <m:e>
-                              <m:sSub>
-                                <m:e>
-                                  <m:r>
-                                    <m:t>n</m:t>
-                                  </m:r>
-                                </m:e>
-                                <m:sub>
-                                  <m:r>
-                                    <m:t>i</m:t>
-                                  </m:r>
-                                </m:sub>
-                              </m:sSub>
-                            </m:e>
-                          </m:d>
-                          <m:r>
-                            <m:rPr>
-                              <m:sty m:val="p"/>
-                            </m:rPr>
-                            <m:t>∈</m:t>
-                          </m:r>
-                          <m:r>
-                            <m:rPr>
-                              <m:sty m:val="p"/>
-                            </m:rPr>
-                            <m:t>{</m:t>
-                          </m:r>
-                          <m:r>
-                            <m:t>P</m:t>
-                          </m:r>
-                          <m:r>
-                            <m:t>r</m:t>
-                          </m:r>
-                          <m:r>
-                            <m:t>o</m:t>
-                          </m:r>
-                          <m:r>
-                            <m:t>c</m:t>
-                          </m:r>
-                          <m:r>
-                            <m:t>e</m:t>
-                          </m:r>
-                          <m:r>
-                            <m:t>s</m:t>
-                          </m:r>
-                          <m:r>
-                            <m:t>s</m:t>
-                          </m:r>
-                          <m:r>
-                            <m:rPr>
-                              <m:sty m:val="p"/>
-                            </m:rPr>
-                            <m:t>,</m:t>
-                          </m:r>
-                          <m:r>
-                            <m:t>R</m:t>
-                          </m:r>
-                          <m:r>
-                            <m:t>e</m:t>
-                          </m:r>
-                          <m:r>
-                            <m:t>p</m:t>
-                          </m:r>
-                          <m:r>
-                            <m:t>o</m:t>
-                          </m:r>
-                          <m:r>
-                            <m:t>s</m:t>
-                          </m:r>
-                          <m:r>
-                            <m:t>i</m:t>
-                          </m:r>
-                          <m:r>
-                            <m:t>t</m:t>
-                          </m:r>
-                          <m:r>
-                            <m:t>o</m:t>
-                          </m:r>
-                          <m:r>
-                            <m:t>r</m:t>
-                          </m:r>
-                          <m:r>
-                            <m:t>y</m:t>
-                          </m:r>
-                          <m:r>
-                            <m:rPr>
-                              <m:sty m:val="p"/>
-                            </m:rPr>
-                            <m:t>}</m:t>
-                          </m:r>
-                        </m:e>
-                      </m:mr>
-                      <m:mr>
-                        <m:e/>
-                        <m:e>
-                          <m:sSub>
-                            <m:e>
-                              <m:r>
-                                <m:t>s</m:t>
-                              </m:r>
-                            </m:e>
-                            <m:sub>
-                              <m:r>
-                                <m:t>j</m:t>
-                              </m:r>
-                            </m:sub>
-                          </m:sSub>
-                          <m:r>
-                            <m:rPr>
-                              <m:sty m:val="p"/>
-                            </m:rPr>
-                            <m:t>≥</m:t>
-                          </m:r>
-                          <m:sSub>
-                            <m:e>
-                              <m:r>
-                                <m:t>s</m:t>
-                              </m:r>
-                            </m:e>
-                            <m:sub>
-                              <m:r>
-                                <m:t>i</m:t>
-                              </m:r>
-                            </m:sub>
-                          </m:sSub>
-                          <m:r>
-                            <m:t> </m:t>
-                          </m:r>
-                          <m:r>
-                            <m:rPr>
-                              <m:sty m:val="p"/>
-                            </m:rPr>
-                            <m:t>∀</m:t>
-                          </m:r>
-                          <m:sSub>
-                            <m:e>
-                              <m:r>
-                                <m:t>a</m:t>
-                              </m:r>
-                            </m:e>
-                            <m:sub>
-                              <m:r>
-                                <m:t>i</m:t>
-                              </m:r>
-                              <m:r>
-                                <m:t>j</m:t>
-                              </m:r>
-                            </m:sub>
-                          </m:sSub>
-                          <m:r>
-                            <m:rPr>
-                              <m:sty m:val="p"/>
-                            </m:rPr>
-                            <m:t>∈</m:t>
-                          </m:r>
-                          <m:r>
-                            <m:t>A</m:t>
-                          </m:r>
-                          <m:r>
-                            <m:rPr>
-                              <m:sty m:val="p"/>
-                            </m:rPr>
-                            <m:t>,</m:t>
-                          </m:r>
-                          <m:r>
-                            <m:t>l</m:t>
-                          </m:r>
-                          <m:r>
-                            <m:t>a</m:t>
-                          </m:r>
-                          <m:r>
-                            <m:t>b</m:t>
-                          </m:r>
-                          <m:r>
-                            <m:t>e</m:t>
-                          </m:r>
-                          <m:r>
-                            <m:t>l</m:t>
-                          </m:r>
-                          <m:d>
-                            <m:dPr>
-                              <m:begChr m:val="("/>
-                              <m:endChr m:val=")"/>
-                              <m:sepChr m:val=""/>
-                              <m:grow/>
-                            </m:dPr>
-                            <m:e>
-                              <m:sSub>
-                                <m:e>
-                                  <m:r>
-                                    <m:t>a</m:t>
-                                  </m:r>
-                                </m:e>
-                                <m:sub>
-                                  <m:r>
-                                    <m:t>i</m:t>
-                                  </m:r>
-                                  <m:r>
-                                    <m:t>j</m:t>
-                                  </m:r>
-                                </m:sub>
-                              </m:sSub>
-                            </m:e>
-                          </m:d>
-                          <m:r>
-                            <m:rPr>
-                              <m:sty m:val="p"/>
-                            </m:rPr>
-                            <m:t>=</m:t>
-                          </m:r>
-                          <m:r>
-                            <m:t>R</m:t>
-                          </m:r>
-                          <m:r>
-                            <m:t>e</m:t>
-                          </m:r>
-                          <m:r>
-                            <m:t>q</m:t>
-                          </m:r>
-                          <m:r>
-                            <m:t>u</m:t>
-                          </m:r>
-                          <m:r>
-                            <m:t>i</m:t>
-                          </m:r>
-                          <m:r>
-                            <m:t>r</m:t>
-                          </m:r>
-                          <m:r>
-                            <m:t>e</m:t>
-                          </m:r>
-                          <m:r>
-                            <m:t>s</m:t>
-                          </m:r>
-                        </m:e>
-                      </m:mr>
-                      <m:mr>
-                        <m:e/>
-                        <m:e>
-                          <m:sSub>
-                            <m:e>
-                              <m:r>
-                                <m:t>s</m:t>
-                              </m:r>
-                            </m:e>
-                            <m:sub>
-                              <m:r>
-                                <m:t>i</m:t>
-                              </m:r>
-                              <m:r>
-                                <m:t>j</m:t>
-                              </m:r>
-                            </m:sub>
-                          </m:sSub>
-                          <m:r>
-                            <m:rPr>
-                              <m:sty m:val="p"/>
-                            </m:rPr>
-                            <m:t>+</m:t>
-                          </m:r>
-                          <m:sSub>
-                            <m:e>
-                              <m:r>
-                                <m:t>s</m:t>
-                              </m:r>
-                            </m:e>
-                            <m:sub>
-                              <m:r>
-                                <m:t>k</m:t>
-                              </m:r>
-                              <m:r>
-                                <m:t>h</m:t>
-                              </m:r>
-                            </m:sub>
-                          </m:sSub>
-                          <m:r>
-                            <m:rPr>
-                              <m:sty m:val="p"/>
-                            </m:rPr>
-                            <m:t>≤</m:t>
-                          </m:r>
-                          <m:r>
-                            <m:t>1</m:t>
-                          </m:r>
-                          <m:r>
-                            <m:t> </m:t>
-                          </m:r>
-                          <m:r>
-                            <m:rPr>
-                              <m:sty m:val="p"/>
-                            </m:rPr>
-                            <m:t>∀</m:t>
-                          </m:r>
-                          <m:d>
-                            <m:dPr>
-                              <m:begChr m:val="("/>
-                              <m:endChr m:val=")"/>
-                              <m:sepChr m:val=""/>
-                              <m:grow/>
-                            </m:dPr>
-                            <m:e>
-                              <m:sSub>
-                                <m:e>
-                                  <m:r>
-                                    <m:t>a</m:t>
-                                  </m:r>
-                                </m:e>
-                                <m:sub>
-                                  <m:r>
-                                    <m:t>i</m:t>
-                                  </m:r>
-                                  <m:r>
-                                    <m:t>k</m:t>
-                                  </m:r>
-                                </m:sub>
-                              </m:sSub>
-                              <m:r>
-                                <m:rPr>
-                                  <m:sty m:val="p"/>
-                                </m:rPr>
-                                <m:t>∈</m:t>
-                              </m:r>
-                              <m:r>
-                                <m:t>A</m:t>
-                              </m:r>
-                              <m:r>
-                                <m:t> </m:t>
-                              </m:r>
-                              <m:r>
-                                <m:t>s</m:t>
-                              </m:r>
-                              <m:r>
-                                <m:rPr>
-                                  <m:sty m:val="p"/>
-                                </m:rPr>
-                                <m:t>.</m:t>
-                              </m:r>
-                              <m:r>
-                                <m:t>t</m:t>
-                              </m:r>
-                              <m:r>
-                                <m:rPr>
-                                  <m:sty m:val="p"/>
-                                </m:rPr>
-                                <m:t>.</m:t>
-                              </m:r>
-                              <m:r>
-                                <m:t> </m:t>
-                              </m:r>
-                              <m:r>
-                                <m:t>l</m:t>
-                              </m:r>
-                              <m:r>
-                                <m:t>a</m:t>
-                              </m:r>
-                              <m:r>
-                                <m:t>b</m:t>
-                              </m:r>
-                              <m:r>
-                                <m:t>e</m:t>
-                              </m:r>
-                              <m:r>
-                                <m:t>l</m:t>
-                              </m:r>
-                              <m:d>
-                                <m:dPr>
-                                  <m:begChr m:val="("/>
-                                  <m:endChr m:val=")"/>
-                                  <m:sepChr m:val=""/>
-                                  <m:grow/>
-                                </m:dPr>
-                                <m:e>
-                                  <m:sSub>
-                                    <m:e>
-                                      <m:r>
-                                        <m:t>a</m:t>
-                                      </m:r>
-                                    </m:e>
-                                    <m:sub>
-                                      <m:r>
-                                        <m:t>i</m:t>
-                                      </m:r>
-                                      <m:r>
-                                        <m:t>k</m:t>
-                                      </m:r>
-                                    </m:sub>
-                                  </m:sSub>
-                                </m:e>
-                              </m:d>
-                              <m:r>
-                                <m:rPr>
-                                  <m:sty m:val="p"/>
-                                </m:rPr>
-                                <m:t>=</m:t>
-                              </m:r>
-                              <m:r>
-                                <m:t>F</m:t>
-                              </m:r>
-                              <m:r>
-                                <m:t>l</m:t>
-                              </m:r>
-                              <m:r>
-                                <m:t>o</m:t>
-                              </m:r>
-                              <m:r>
-                                <m:t>w</m:t>
-                              </m:r>
-                            </m:e>
-                          </m:d>
-                          <m:r>
-                            <m:rPr>
-                              <m:sty m:val="p"/>
-                            </m:rPr>
-                            <m:t>,</m:t>
-                          </m:r>
-                          <m:d>
-                            <m:dPr>
-                              <m:begChr m:val="("/>
-                              <m:endChr m:val=")"/>
-                              <m:sepChr m:val=""/>
-                              <m:grow/>
-                            </m:dPr>
-                            <m:e>
-                              <m:sSub>
-                                <m:e>
-                                  <m:r>
-                                    <m:t>a</m:t>
-                                  </m:r>
-                                </m:e>
-                                <m:sub>
-                                  <m:r>
-                                    <m:t>j</m:t>
-                                  </m:r>
-                                  <m:r>
-                                    <m:t>h</m:t>
-                                  </m:r>
-                                </m:sub>
-                              </m:sSub>
-                              <m:r>
-                                <m:rPr>
-                                  <m:sty m:val="p"/>
-                                </m:rPr>
-                                <m:t>∉</m:t>
-                              </m:r>
-                              <m:r>
-                                <m:t>A</m:t>
-                              </m:r>
-                              <m:r>
-                                <m:t> </m:t>
-                              </m:r>
-                              <m:r>
-                                <m:t>s</m:t>
-                              </m:r>
-                              <m:r>
-                                <m:rPr>
-                                  <m:sty m:val="p"/>
-                                </m:rPr>
-                                <m:t>.</m:t>
-                              </m:r>
-                              <m:r>
-                                <m:t>t</m:t>
-                              </m:r>
-                              <m:r>
-                                <m:rPr>
-                                  <m:sty m:val="p"/>
-                                </m:rPr>
-                                <m:t>.</m:t>
-                              </m:r>
-                              <m:r>
-                                <m:t> </m:t>
-                              </m:r>
-                              <m:r>
-                                <m:t>l</m:t>
-                              </m:r>
-                              <m:r>
-                                <m:t>a</m:t>
-                              </m:r>
-                              <m:r>
-                                <m:t>b</m:t>
-                              </m:r>
-                              <m:r>
-                                <m:t>e</m:t>
-                              </m:r>
-                              <m:r>
-                                <m:t>l</m:t>
-                              </m:r>
-                              <m:d>
-                                <m:dPr>
-                                  <m:begChr m:val="("/>
-                                  <m:endChr m:val=")"/>
-                                  <m:sepChr m:val=""/>
-                                  <m:grow/>
-                                </m:dPr>
-                                <m:e>
-                                  <m:sSub>
-                                    <m:e>
-                                      <m:r>
-                                        <m:t>a</m:t>
-                                      </m:r>
-                                    </m:e>
-                                    <m:sub>
-                                      <m:r>
-                                        <m:t>j</m:t>
-                                      </m:r>
-                                      <m:r>
-                                        <m:t>h</m:t>
-                                      </m:r>
-                                    </m:sub>
-                                  </m:sSub>
-                                </m:e>
-                              </m:d>
-                              <m:r>
-                                <m:rPr>
-                                  <m:sty m:val="p"/>
-                                </m:rPr>
-                                <m:t>=</m:t>
-                              </m:r>
-                              <m:r>
-                                <m:t>I</m:t>
-                              </m:r>
-                              <m:r>
-                                <m:t>s</m:t>
-                              </m:r>
-                              <m:r>
-                                <m:t>C</m:t>
-                              </m:r>
-                              <m:r>
-                                <m:t>o</m:t>
-                              </m:r>
-                              <m:r>
-                                <m:t>m</m:t>
-                              </m:r>
-                              <m:r>
-                                <m:t>p</m:t>
-                              </m:r>
-                              <m:r>
-                                <m:t>a</m:t>
-                              </m:r>
-                              <m:r>
-                                <m:t>t</m:t>
-                              </m:r>
-                              <m:r>
-                                <m:t>i</m:t>
-                              </m:r>
-                              <m:r>
-                                <m:t>b</m:t>
-                              </m:r>
-                              <m:r>
-                                <m:t>l</m:t>
-                              </m:r>
-                              <m:r>
-                                <m:t>e</m:t>
-                              </m:r>
-                            </m:e>
-                          </m:d>
-                        </m:e>
-                      </m:mr>
-                      <m:mr>
-                        <m:e/>
-                        <m:e>
-                          <m:sSub>
-                            <m:e>
-                              <m:r>
-                                <m:t>w</m:t>
-                              </m:r>
-                            </m:e>
-                            <m:sub>
-                              <m:r>
-                                <m:t>i</m:t>
-                              </m:r>
-                            </m:sub>
-                          </m:sSub>
-                          <m:r>
-                            <m:rPr>
-                              <m:sty m:val="p"/>
-                            </m:rPr>
-                            <m:t>=</m:t>
-                          </m:r>
-                          <m:d>
-                            <m:dPr>
-                              <m:begChr m:val="{"/>
-                              <m:endChr m:val=""/>
-                              <m:sepChr m:val=""/>
-                              <m:grow/>
-                            </m:dPr>
-                            <m:e>
-                              <m:m>
-                                <m:mPr>
-                                  <m:baseJc m:val="center"/>
-                                  <m:plcHide m:val="on"/>
-                                  <m:mcs>
-                                    <m:mc>
-                                      <m:mcPr>
-                                        <m:mcJc m:val="left"/>
-                                        <m:count m:val="1"/>
-                                      </m:mcPr>
-                                    </m:mc>
-                                  </m:mcs>
-                                </m:mPr>
-                                <m:mr>
-                                  <m:e>
-                                    <m:r>
-                                      <m:t>0.5</m:t>
-                                    </m:r>
-                                    <m:r>
-                                      <m:t> </m:t>
-                                    </m:r>
-                                    <m:r>
-                                      <m:t>i</m:t>
-                                    </m:r>
-                                    <m:r>
-                                      <m:t>f</m:t>
-                                    </m:r>
-                                    <m:r>
-                                      <m:t> </m:t>
-                                    </m:r>
-                                    <m:d>
-                                      <m:dPr>
-                                        <m:begChr m:val="("/>
-                                        <m:endChr m:val=")"/>
-                                        <m:sepChr m:val=""/>
-                                        <m:grow/>
-                                      </m:dPr>
-                                      <m:e>
-                                        <m:r>
-                                          <m:t>P</m:t>
-                                        </m:r>
-                                        <m:r>
-                                          <m:t>r</m:t>
-                                        </m:r>
-                                        <m:r>
-                                          <m:t>e</m:t>
-                                        </m:r>
-                                        <m:r>
-                                          <m:t>f</m:t>
-                                        </m:r>
-                                        <m:r>
-                                          <m:t>e</m:t>
-                                        </m:r>
-                                        <m:r>
-                                          <m:t>r</m:t>
-                                        </m:r>
-                                        <m:r>
-                                          <m:t>r</m:t>
-                                        </m:r>
-                                        <m:r>
-                                          <m:t>e</m:t>
-                                        </m:r>
-                                        <m:r>
-                                          <m:t>d</m:t>
-                                        </m:r>
-                                        <m:r>
-                                          <m:rPr>
-                                            <m:sty m:val="p"/>
-                                          </m:rPr>
-                                          <m:t>,</m:t>
-                                        </m:r>
-                                        <m:r>
-                                          <m:t>T</m:t>
-                                        </m:r>
-                                        <m:r>
-                                          <m:t>r</m:t>
-                                        </m:r>
-                                        <m:r>
-                                          <m:t>u</m:t>
-                                        </m:r>
-                                        <m:r>
-                                          <m:t>e</m:t>
-                                        </m:r>
-                                      </m:e>
-                                    </m:d>
-                                    <m:r>
-                                      <m:rPr>
-                                        <m:sty m:val="p"/>
-                                      </m:rPr>
-                                      <m:t>∈</m:t>
-                                    </m:r>
-                                    <m:r>
-                                      <m:t>p</m:t>
-                                    </m:r>
-                                    <m:r>
-                                      <m:t>r</m:t>
-                                    </m:r>
-                                    <m:r>
-                                      <m:t>o</m:t>
-                                    </m:r>
-                                    <m:r>
-                                      <m:t>p</m:t>
-                                    </m:r>
-                                    <m:r>
-                                      <m:t>s</m:t>
-                                    </m:r>
-                                    <m:d>
-                                      <m:dPr>
-                                        <m:begChr m:val="("/>
-                                        <m:endChr m:val=")"/>
-                                        <m:sepChr m:val=""/>
-                                        <m:grow/>
-                                      </m:dPr>
-                                      <m:e>
-                                        <m:sSub>
-                                          <m:e>
-                                            <m:r>
-                                              <m:t>n</m:t>
-                                            </m:r>
-                                          </m:e>
-                                          <m:sub>
-                                            <m:r>
-                                              <m:t>i</m:t>
-                                            </m:r>
-                                          </m:sub>
-                                        </m:sSub>
-                                      </m:e>
-                                    </m:d>
-                                  </m:e>
-                                </m:mr>
-                                <m:mr>
-                                  <m:e>
-                                    <m:r>
-                                      <m:t>1.0</m:t>
-                                    </m:r>
-                                    <m:r>
-                                      <m:t> </m:t>
-                                    </m:r>
-                                    <m:r>
-                                      <m:t>o</m:t>
-                                    </m:r>
-                                    <m:r>
-                                      <m:t>t</m:t>
-                                    </m:r>
-                                    <m:r>
-                                      <m:t>h</m:t>
-                                    </m:r>
-                                    <m:r>
-                                      <m:t>e</m:t>
-                                    </m:r>
-                                    <m:r>
-                                      <m:t>r</m:t>
-                                    </m:r>
-                                    <m:r>
-                                      <m:t>w</m:t>
-                                    </m:r>
-                                    <m:r>
-                                      <m:t>i</m:t>
-                                    </m:r>
-                                    <m:r>
-                                      <m:t>s</m:t>
-                                    </m:r>
-                                    <m:r>
-                                      <m:t>e</m:t>
-                                    </m:r>
-                                  </m:e>
-                                </m:mr>
-                              </m:m>
-                            </m:e>
-                          </m:d>
-                        </m:e>
-                      </m:mr>
-                    </m:m>
-                  </m:oMath>
-                </a14:m>
-              </a:p>
-            </p:txBody>
-          </p:sp>
-        </mc:Choice>
-      </mc:AlternateContent>
+      <p:sp>
+        <p:nvSpPr>
+          <p:cNvPr id="3" name="Content Placeholder 2"/>
+          <p:cNvSpPr>
+            <a:spLocks noGrp="1"/>
+          </p:cNvSpPr>
+          <p:nvPr>
+            <p:ph idx="1" sz="half"/>
+          </p:nvPr>
+        </p:nvSpPr>
+        <p:spPr/>
+        <p:txBody>
+          <a:bodyPr/>
+          <a:lstStyle/>
+          <a:p>
+            <a:pPr lvl="0" indent="0" marL="0">
+              <a:buNone/>
+            </a:pPr>
+            <a:r>
+              <a:rPr/>
+              <a:t>Out of all matching services, only some of them must be selected:</a:t>
+            </a:r>
+          </a:p>
+          <a:p>
+            <a:pPr lvl="0" indent="-342900" marL="342900">
+              <a:buAutoNum type="arabicPeriod"/>
+            </a:pPr>
+            <a:r>
+              <a:rPr/>
+              <a:t>The amount of </a:t>
+            </a:r>
+            <a:r>
+              <a:rPr i="1"/>
+              <a:t>selected services is minimized</a:t>
+            </a:r>
+            <a:r>
+              <a:rPr/>
+              <a:t>.</a:t>
+            </a:r>
+          </a:p>
+          <a:p>
+            <a:pPr lvl="0" indent="-342900" marL="342900">
+              <a:buAutoNum type="arabicPeriod"/>
+            </a:pPr>
+            <a:r>
+              <a:rPr i="1"/>
+              <a:t>Coverage</a:t>
+            </a:r>
+            <a:r>
+              <a:rPr/>
+              <a:t>: all processes/repositories in the DFD must be covered.</a:t>
+            </a:r>
+          </a:p>
+          <a:p>
+            <a:pPr lvl="0" indent="-342900" marL="342900">
+              <a:buAutoNum type="arabicPeriod"/>
+            </a:pPr>
+            <a:r>
+              <a:rPr i="1"/>
+              <a:t>Dependency</a:t>
+            </a:r>
+            <a:r>
+              <a:rPr/>
+              <a:t>: if a service is selected, all its required services must be selected too.</a:t>
+            </a:r>
+          </a:p>
+          <a:p>
+            <a:pPr lvl="0" indent="-342900" marL="342900">
+              <a:buAutoNum type="arabicPeriod"/>
+            </a:pPr>
+            <a:r>
+              <a:rPr i="1"/>
+              <a:t>Compatibility</a:t>
+            </a:r>
+            <a:r>
+              <a:rPr/>
+              <a:t>: a service can be selected only if it is compatible with the services selected for the adjacent nodes in the DFD.</a:t>
+            </a:r>
+          </a:p>
+          <a:p>
+            <a:pPr lvl="0" indent="-342900" marL="342900">
+              <a:buAutoNum type="arabicPeriod"/>
+            </a:pPr>
+            <a:r>
+              <a:rPr i="1"/>
+              <a:t>Preference</a:t>
+            </a:r>
+            <a:r>
+              <a:rPr/>
+              <a:t>: preferred services should have more chances to be selected.</a:t>
+            </a:r>
+          </a:p>
+          <a:p>
+            <a:pPr lvl="0" indent="0" marL="0">
+              <a:buNone/>
+            </a:pPr>
+            <a:r>
+              <a:rPr/>
+              <a:t>This is a </a:t>
+            </a:r>
+            <a:r>
+              <a:rPr i="1"/>
+              <a:t>facility location optimization</a:t>
+            </a:r>
+            <a:r>
+              <a:rPr/>
+              <a:t> linear programming problem (available on </a:t>
+            </a:r>
+            <a:r>
+              <a:rPr>
+                <a:hlinkClick r:id="rId2"/>
+              </a:rPr>
+              <a:t>Github</a:t>
+            </a:r>
+            <a:r>
+              <a:rPr/>
+              <a:t> w/ Python + CPlex library).</a:t>
+            </a:r>
+          </a:p>
+        </p:txBody>
+      </p:sp>
       <p:sp>
         <p:nvSpPr>
           <p:cNvPr id="4" name="Content Placeholder 3"/>
@@ -7897,7 +5843,7 @@
             <a:pPr lvl="0"/>
             <a:r>
               <a:rPr/>
-              <a:t>We have addressed such </a:t>
+              <a:t>We addressed such </a:t>
             </a:r>
             <a:r>
               <a:rPr b="1"/>
@@ -7925,7 +5871,7 @@
             </a:r>
             <a:r>
               <a:rPr/>
-              <a:t>: matching and selection should consider more complex architectural patterns (Lakehouse to replace both data lakes and warehouses) as well as support additional constraints (e.g., consider only some service vendors).</a:t>
+              <a:t>: matching and selection should consider more complex architectural patterns as well as support additional constraints.</a:t>
             </a:r>
           </a:p>
           <a:p>
@@ -7947,7 +5893,7 @@
             </a:r>
             <a:r>
               <a:rPr/>
-              <a:t>: a complete approach should also consider how many instances of a service are required (to do so, a cost model should be studied).</a:t>
+              <a:t>: a complete approach should also consider how many instances of a service are required.</a:t>
             </a:r>
           </a:p>
           <a:p>
@@ -7958,7 +5904,7 @@
             </a:r>
             <a:r>
               <a:rPr/>
-              <a:t>: the definition both service graph and process graph relies on manual work, more automated techniques should be explored (e.g., NLPs)</a:t>
+              <a:t>: the definition both graphs relies on manual work, more automated techniques should be explored.</a:t>
             </a:r>
           </a:p>
           <a:p>
@@ -7969,7 +5915,7 @@
             </a:r>
             <a:r>
               <a:rPr/>
-              <a:t>: while catalog and meta-data management services do not directly introduce functionalities for data transformation and exploitation, the design should also recommend services helping in the management of the platform itself.</a:t>
+              <a:t>: the design should also recommend services helping in the management of the platform itself.</a:t>
             </a:r>
           </a:p>
         </p:txBody>
@@ -8538,7 +6484,7 @@
             <a:pPr lvl="0"/>
             <a:r>
               <a:rPr/>
-              <a:t>Each CSP offers </a:t>
+              <a:t>CSPs offer </a:t>
             </a:r>
             <a:r>
               <a:rPr i="1"/>
@@ -8739,7 +6685,7 @@
             </a:r>
             <a:r>
               <a:rPr/>
-              <a:t> are the backbone of a data platform encode many constraints on the choices to be made…</a:t>
+              <a:t> encode many constraints on the choices to be made…</a:t>
             </a:r>
           </a:p>
           <a:p>

</xml_diff>

<commit_message>
Deploying to gh-pages from @ ManuelePasini/slides-markdown@05e53087ac4ab1ba5cd0e6a304d0afad20213ddd 🚀
</commit_message>
<xml_diff>
--- a/dolap_2024_slides_2version.pptx
+++ b/dolap_2024_slides_2version.pptx
@@ -6054,19 +6054,14 @@
           <a:bodyPr/>
           <a:lstStyle/>
           <a:p>
-            <a:pPr lvl="0" indent="0" marL="0">
-              <a:buNone/>
-            </a:pPr>
-            <a:r>
-              <a:rPr/>
-              <a:t>is an infrastructure that facilitates the ingestion, storage, management, and exploitation of large volumes of heterogeneous data.</a:t>
-            </a:r>
-          </a:p>
-          <a:p>
             <a:pPr lvl="0"/>
             <a:r>
+              <a:rPr/>
+              <a:t>Is a </a:t>
+            </a:r>
+            <a:r>
               <a:rPr i="1"/>
-              <a:t>Centralized</a:t>
+              <a:t>centralized</a:t>
             </a:r>
             <a:r>
               <a:rPr/>

</xml_diff>

<commit_message>
Deploying to gh-pages from @ ManuelePasini/slides-markdown@7b9c44582c59a10c7770fefaa7286c7cea4c9de5 🚀
</commit_message>
<xml_diff>
--- a/dolap_2024_slides_2version.pptx
+++ b/dolap_2024_slides_2version.pptx
@@ -5701,8 +5701,8 @@
         </p:blipFill>
         <p:spPr bwMode="auto">
           <a:xfrm>
-            <a:off x="1320800" y="1193800"/>
-            <a:ext cx="6515100" cy="2882900"/>
+            <a:off x="2413000" y="1193800"/>
+            <a:ext cx="4318000" cy="2882900"/>
           </a:xfrm>
           <a:prstGeom prst="rect">
             <a:avLst/>

</xml_diff>

<commit_message>
Deploying to gh-pages from @ ManuelePasini/slides-markdown@12710bfafc578adb22c66ac5122538a1507bc036 🚀
</commit_message>
<xml_diff>
--- a/dolap_2024_slides_2version.pptx
+++ b/dolap_2024_slides_2version.pptx
@@ -5701,8 +5701,8 @@
         </p:blipFill>
         <p:spPr bwMode="auto">
           <a:xfrm>
-            <a:off x="2413000" y="1193800"/>
-            <a:ext cx="4318000" cy="2882900"/>
+            <a:off x="1320800" y="1193800"/>
+            <a:ext cx="6515100" cy="2882900"/>
           </a:xfrm>
           <a:prstGeom prst="rect">
             <a:avLst/>

</xml_diff>